<commit_message>
Colocando de volta atividade resolvida.
</commit_message>
<xml_diff>
--- a/docs/modulos/03-visao/slides-2.pptx
+++ b/docs/modulos/03-visao/slides-2.pptx
@@ -6693,7 +6693,7 @@
                 <a:latin typeface="Verdana"/>
                 <a:cs typeface="Verdana"/>
               </a:rPr>
-              <a:t>Detecção de retas e circunferências</a:t>
+              <a:t>Visão de alto nível</a:t>
             </a:r>
             <a:endParaRPr sz="2000" b="1" i="0">
               <a:solidFill>
@@ -10366,7 +10366,7 @@
         </p:nvSpPr>
         <p:spPr bwMode="auto">
           <a:xfrm flipH="0" flipV="0">
-            <a:off x="1510542" y="5905978"/>
+            <a:off x="1510542" y="5905977"/>
             <a:ext cx="6496768" cy="602280"/>
           </a:xfrm>
           <a:prstGeom prst="rect">

</xml_diff>